<commit_message>
Removed some old text
</commit_message>
<xml_diff>
--- a/ARM and Automate Yourself for Speedy Application Deployments.pptx
+++ b/ARM and Automate Yourself for Speedy Application Deployments.pptx
@@ -7796,19 +7796,6 @@
             <a:endParaRPr lang="en-US" sz="3200" dirty="0"/>
           </a:p>
           <a:p>
-            <a:r>
-              <a:rPr lang="en-US" sz="3200" dirty="0"/>
-              <a:t>OneNote (Take Your Angular App Glamping): </a:t>
-            </a:r>
-            <a:br>
-              <a:rPr lang="en-US" sz="3200" dirty="0"/>
-            </a:br>
-            <a:r>
-              <a:rPr lang="en-US" sz="3200" dirty="0">
-                <a:hlinkClick r:id="rId5"/>
-              </a:rPr>
-              <a:t>https://1drv.ms/u/s!ArCsAhaG3htJogmm7yGnOk-gCNTZ</a:t>
-            </a:r>
             <a:endParaRPr lang="en-US" sz="3200" dirty="0"/>
           </a:p>
           <a:p>

</xml_diff>